<commit_message>
shape comparison CR for data vs MC (nominal and mtt)
</commit_message>
<xml_diff>
--- a/Documents for Progress/NTUA_TMGReport_24Feb.pptx
+++ b/Documents for Progress/NTUA_TMGReport_24Feb.pptx
@@ -220,7 +220,7 @@
           <a:p>
             <a:fld id="{8CD5EADE-870B-3C4D-92F6-FE927CFCE2A1}" type="datetime1">
               <a:rPr lang="en-US" smtClean="0"/>
-              <a:t>2/23/20</a:t>
+              <a:t>2/24/20</a:t>
             </a:fld>
             <a:endParaRPr lang="en-GB"/>
           </a:p>
@@ -426,7 +426,7 @@
           <a:p>
             <a:fld id="{4A3A8317-869C-EC49-8CB2-3286EE886873}" type="datetime1">
               <a:rPr lang="en-US" smtClean="0"/>
-              <a:t>2/23/20</a:t>
+              <a:t>2/24/20</a:t>
             </a:fld>
             <a:endParaRPr lang="en-GB"/>
           </a:p>
@@ -760,7 +760,7 @@
           <a:p>
             <a:fld id="{B49D5E6A-E658-F947-B519-3BD764463DDB}" type="datetime1">
               <a:rPr lang="en-US" smtClean="0"/>
-              <a:t>2/23/20</a:t>
+              <a:t>2/24/20</a:t>
             </a:fld>
             <a:endParaRPr lang="en-GB"/>
           </a:p>
@@ -1028,7 +1028,7 @@
           <a:p>
             <a:fld id="{3FD6B7D5-59BD-A94A-8259-AFB77C1C6F6C}" type="datetime1">
               <a:rPr lang="en-US" smtClean="0"/>
-              <a:t>2/23/20</a:t>
+              <a:t>2/24/20</a:t>
             </a:fld>
             <a:endParaRPr lang="en-US" dirty="0"/>
           </a:p>
@@ -1235,7 +1235,7 @@
           <a:p>
             <a:fld id="{22747042-83B4-2D44-B16D-692521656AEA}" type="datetime1">
               <a:rPr lang="en-US" smtClean="0"/>
-              <a:t>2/23/20</a:t>
+              <a:t>2/24/20</a:t>
             </a:fld>
             <a:endParaRPr lang="en-US" dirty="0"/>
           </a:p>
@@ -1490,7 +1490,7 @@
           <a:p>
             <a:fld id="{123C6174-D222-ED47-AF35-85B52783FDE1}" type="datetime1">
               <a:rPr lang="en-US" smtClean="0"/>
-              <a:t>2/23/20</a:t>
+              <a:t>2/24/20</a:t>
             </a:fld>
             <a:endParaRPr lang="en-US" dirty="0"/>
           </a:p>
@@ -1681,7 +1681,7 @@
           <a:p>
             <a:fld id="{92BB3830-AA68-4343-953F-F849943EB849}" type="datetime1">
               <a:rPr lang="en-US" smtClean="0"/>
-              <a:t>2/23/20</a:t>
+              <a:t>2/24/20</a:t>
             </a:fld>
             <a:endParaRPr lang="en-GB"/>
           </a:p>
@@ -1855,7 +1855,7 @@
           <a:p>
             <a:fld id="{13F0FE4D-A637-F644-BCB7-BB01E9473082}" type="datetime1">
               <a:rPr lang="en-US" smtClean="0"/>
-              <a:t>2/23/20</a:t>
+              <a:t>2/24/20</a:t>
             </a:fld>
             <a:endParaRPr lang="en-GB"/>
           </a:p>
@@ -2105,7 +2105,7 @@
           <a:p>
             <a:fld id="{7916914C-F633-3B4D-8E7C-AF9878FBCAB2}" type="datetime1">
               <a:rPr lang="en-US" smtClean="0"/>
-              <a:t>2/23/20</a:t>
+              <a:t>2/24/20</a:t>
             </a:fld>
             <a:endParaRPr lang="en-GB"/>
           </a:p>
@@ -2341,7 +2341,7 @@
           <a:p>
             <a:fld id="{1BEE493E-6ECC-2D49-AA37-47715FC69928}" type="datetime1">
               <a:rPr lang="en-US" smtClean="0"/>
-              <a:t>2/23/20</a:t>
+              <a:t>2/24/20</a:t>
             </a:fld>
             <a:endParaRPr lang="en-GB"/>
           </a:p>
@@ -2712,7 +2712,7 @@
           <a:p>
             <a:fld id="{44D2375D-BCDA-CD42-A7D1-F6C0DA2CE615}" type="datetime1">
               <a:rPr lang="en-US" smtClean="0"/>
-              <a:t>2/23/20</a:t>
+              <a:t>2/24/20</a:t>
             </a:fld>
             <a:endParaRPr lang="en-GB"/>
           </a:p>
@@ -2834,7 +2834,7 @@
           <a:p>
             <a:fld id="{DF706FF0-E883-3242-B340-EF59CDD02701}" type="datetime1">
               <a:rPr lang="en-US" smtClean="0"/>
-              <a:t>2/23/20</a:t>
+              <a:t>2/24/20</a:t>
             </a:fld>
             <a:endParaRPr lang="en-GB"/>
           </a:p>
@@ -2933,7 +2933,7 @@
           <a:p>
             <a:fld id="{A72B1547-4678-7444-8B0B-D61236993AA6}" type="datetime1">
               <a:rPr lang="en-US" smtClean="0"/>
-              <a:t>2/23/20</a:t>
+              <a:t>2/24/20</a:t>
             </a:fld>
             <a:endParaRPr lang="en-GB"/>
           </a:p>
@@ -3214,7 +3214,7 @@
           <a:p>
             <a:fld id="{F5C0FF04-D16D-9545-B9FE-2A2509161914}" type="datetime1">
               <a:rPr lang="en-US" smtClean="0"/>
-              <a:t>2/23/20</a:t>
+              <a:t>2/24/20</a:t>
             </a:fld>
             <a:endParaRPr lang="en-GB"/>
           </a:p>
@@ -3370,7 +3370,7 @@
           <a:p>
             <a:fld id="{739BCA09-01A4-7D40-97AF-A677405590ED}" type="datetime1">
               <a:rPr lang="en-US" smtClean="0"/>
-              <a:t>2/23/20</a:t>
+              <a:t>2/24/20</a:t>
             </a:fld>
             <a:endParaRPr lang="en-US" dirty="0"/>
           </a:p>
@@ -3651,7 +3651,7 @@
           <a:p>
             <a:fld id="{95430EDC-66BF-5B4F-9F6B-EF430B2635C2}" type="datetime1">
               <a:rPr lang="en-US" smtClean="0"/>
-              <a:t>2/23/20</a:t>
+              <a:t>2/24/20</a:t>
             </a:fld>
             <a:endParaRPr lang="en-GB"/>
           </a:p>
@@ -3825,7 +3825,7 @@
           <a:p>
             <a:fld id="{C40C6D0C-61E5-A14E-AA64-932059ABBCA0}" type="datetime1">
               <a:rPr lang="en-US" smtClean="0"/>
-              <a:t>2/23/20</a:t>
+              <a:t>2/24/20</a:t>
             </a:fld>
             <a:endParaRPr lang="en-GB"/>
           </a:p>
@@ -4009,7 +4009,7 @@
           <a:p>
             <a:fld id="{686993B2-94FA-8143-ACBD-1339E5A7C63D}" type="datetime1">
               <a:rPr lang="en-US" smtClean="0"/>
-              <a:t>2/23/20</a:t>
+              <a:t>2/24/20</a:t>
             </a:fld>
             <a:endParaRPr lang="en-GB"/>
           </a:p>
@@ -4356,7 +4356,7 @@
           <a:p>
             <a:fld id="{887F3A82-5004-DE46-9B8F-C8D1AE47BCDD}" type="datetime1">
               <a:rPr lang="en-US" smtClean="0"/>
-              <a:t>2/23/20</a:t>
+              <a:t>2/24/20</a:t>
             </a:fld>
             <a:endParaRPr lang="en-US" dirty="0"/>
           </a:p>
@@ -4630,7 +4630,7 @@
           <a:p>
             <a:fld id="{9609816B-101F-E649-A6DB-1B34F62305FD}" type="datetime1">
               <a:rPr lang="en-US" smtClean="0"/>
-              <a:t>2/23/20</a:t>
+              <a:t>2/24/20</a:t>
             </a:fld>
             <a:endParaRPr lang="en-US" dirty="0"/>
           </a:p>
@@ -5008,7 +5008,7 @@
           <a:p>
             <a:fld id="{B4B9C9C3-E10A-4046-99D1-D14A01669CB5}" type="datetime1">
               <a:rPr lang="en-US" smtClean="0"/>
-              <a:t>2/23/20</a:t>
+              <a:t>2/24/20</a:t>
             </a:fld>
             <a:endParaRPr lang="en-US" dirty="0"/>
           </a:p>
@@ -5125,7 +5125,7 @@
           <a:p>
             <a:fld id="{B20DF165-EA06-4348-9825-CC0EB7B994A5}" type="datetime1">
               <a:rPr lang="en-US" smtClean="0"/>
-              <a:t>2/23/20</a:t>
+              <a:t>2/24/20</a:t>
             </a:fld>
             <a:endParaRPr lang="en-US" dirty="0"/>
           </a:p>
@@ -5295,7 +5295,7 @@
           <a:p>
             <a:fld id="{BC939BB5-C2A2-354E-94F1-11C8ABC84871}" type="datetime1">
               <a:rPr lang="en-US" smtClean="0"/>
-              <a:t>2/23/20</a:t>
+              <a:t>2/24/20</a:t>
             </a:fld>
             <a:endParaRPr lang="en-US" dirty="0"/>
           </a:p>
@@ -5679,7 +5679,7 @@
           <a:p>
             <a:fld id="{6BC13A68-213D-F04B-9D09-F80EB8CDDAAA}" type="datetime1">
               <a:rPr lang="en-US" smtClean="0"/>
-              <a:t>2/23/20</a:t>
+              <a:t>2/24/20</a:t>
             </a:fld>
             <a:endParaRPr lang="en-US" dirty="0"/>
           </a:p>
@@ -6061,7 +6061,7 @@
           <a:p>
             <a:fld id="{3C9CB665-2448-6244-98A5-6DB781AF1920}" type="datetime1">
               <a:rPr lang="en-US" smtClean="0"/>
-              <a:t>2/23/20</a:t>
+              <a:t>2/24/20</a:t>
             </a:fld>
             <a:endParaRPr lang="en-US" dirty="0"/>
           </a:p>
@@ -6347,7 +6347,7 @@
           <a:p>
             <a:fld id="{0675E229-76FC-AB46-B5B7-99D6369AD45B}" type="datetime1">
               <a:rPr lang="en-US" smtClean="0"/>
-              <a:t>2/23/20</a:t>
+              <a:t>2/24/20</a:t>
             </a:fld>
             <a:endParaRPr lang="en-US" dirty="0"/>
           </a:p>
@@ -7037,7 +7037,7 @@
           <a:p>
             <a:fld id="{69C84D11-6659-6A4A-919D-F211F249C3CD}" type="datetime1">
               <a:rPr lang="en-US" smtClean="0"/>
-              <a:t>2/23/20</a:t>
+              <a:t>2/24/20</a:t>
             </a:fld>
             <a:endParaRPr lang="en-GB"/>
           </a:p>
@@ -7800,7 +7800,7 @@
           <a:p>
             <a:fld id="{863596AC-079A-914A-A4AA-F10BF720D55E}" type="datetime1">
               <a:rPr lang="en-US" smtClean="0"/>
-              <a:t>2/23/20</a:t>
+              <a:t>2/24/20</a:t>
             </a:fld>
             <a:endParaRPr lang="en-US" dirty="0"/>
           </a:p>
@@ -8048,7 +8048,7 @@
           <a:p>
             <a:fld id="{863596AC-079A-914A-A4AA-F10BF720D55E}" type="datetime1">
               <a:rPr lang="en-US" smtClean="0"/>
-              <a:t>2/23/20</a:t>
+              <a:t>2/24/20</a:t>
             </a:fld>
             <a:endParaRPr lang="en-US" dirty="0"/>
           </a:p>
@@ -8296,7 +8296,7 @@
           <a:p>
             <a:fld id="{863596AC-079A-914A-A4AA-F10BF720D55E}" type="datetime1">
               <a:rPr lang="en-US" smtClean="0"/>
-              <a:t>2/23/20</a:t>
+              <a:t>2/24/20</a:t>
             </a:fld>
             <a:endParaRPr lang="en-US" dirty="0"/>
           </a:p>
@@ -8544,7 +8544,7 @@
           <a:p>
             <a:fld id="{863596AC-079A-914A-A4AA-F10BF720D55E}" type="datetime1">
               <a:rPr lang="en-US" smtClean="0"/>
-              <a:t>2/23/20</a:t>
+              <a:t>2/24/20</a:t>
             </a:fld>
             <a:endParaRPr lang="en-US" dirty="0"/>
           </a:p>
@@ -8792,7 +8792,7 @@
           <a:p>
             <a:fld id="{863596AC-079A-914A-A4AA-F10BF720D55E}" type="datetime1">
               <a:rPr lang="en-US" smtClean="0"/>
-              <a:t>2/23/20</a:t>
+              <a:t>2/24/20</a:t>
             </a:fld>
             <a:endParaRPr lang="en-US" dirty="0"/>
           </a:p>
@@ -9064,7 +9064,7 @@
           <a:p>
             <a:fld id="{863596AC-079A-914A-A4AA-F10BF720D55E}" type="datetime1">
               <a:rPr lang="en-US" smtClean="0"/>
-              <a:t>2/23/20</a:t>
+              <a:t>2/24/20</a:t>
             </a:fld>
             <a:endParaRPr lang="en-US" dirty="0"/>
           </a:p>
@@ -9334,7 +9334,7 @@
           <a:p>
             <a:fld id="{863596AC-079A-914A-A4AA-F10BF720D55E}" type="datetime1">
               <a:rPr lang="en-US" smtClean="0"/>
-              <a:t>2/23/20</a:t>
+              <a:t>2/24/20</a:t>
             </a:fld>
             <a:endParaRPr lang="en-US" dirty="0"/>
           </a:p>
@@ -9609,7 +9609,7 @@
           <a:p>
             <a:fld id="{863596AC-079A-914A-A4AA-F10BF720D55E}" type="datetime1">
               <a:rPr lang="en-US" smtClean="0"/>
-              <a:t>2/23/20</a:t>
+              <a:t>2/24/20</a:t>
             </a:fld>
             <a:endParaRPr lang="en-US" dirty="0"/>
           </a:p>
@@ -9846,7 +9846,43 @@
               <a:rPr lang="en-US" sz="1600" dirty="0">
                 <a:sym typeface="Wingdings" pitchFamily="2" charset="2"/>
               </a:rPr>
-              <a:t>Parton Level quantities</a:t>
+              <a:t>Parton Level quantities with </a:t>
+            </a:r>
+            <a:r>
+              <a:rPr lang="en-US" sz="1600" dirty="0" err="1">
+                <a:sym typeface="Wingdings" pitchFamily="2" charset="2"/>
+              </a:rPr>
+              <a:t>p</a:t>
+            </a:r>
+            <a:r>
+              <a:rPr lang="en-US" sz="1600" baseline="-25000" dirty="0" err="1">
+                <a:sym typeface="Wingdings" pitchFamily="2" charset="2"/>
+              </a:rPr>
+              <a:t>T</a:t>
+            </a:r>
+            <a:r>
+              <a:rPr lang="en-US" sz="1600" baseline="-25000" dirty="0">
+                <a:sym typeface="Wingdings" pitchFamily="2" charset="2"/>
+              </a:rPr>
+              <a:t> </a:t>
+            </a:r>
+            <a:r>
+              <a:rPr lang="en-US" sz="1600" dirty="0">
+                <a:sym typeface="Wingdings" pitchFamily="2" charset="2"/>
+              </a:rPr>
+              <a:t>&gt; 400 GeV (for both </a:t>
+            </a:r>
+            <a:r>
+              <a:rPr lang="en-US" sz="1600" dirty="0" err="1">
+                <a:sym typeface="Wingdings" pitchFamily="2" charset="2"/>
+              </a:rPr>
+              <a:t>partons</a:t>
+            </a:r>
+            <a:r>
+              <a:rPr lang="en-US" sz="1600" dirty="0">
+                <a:sym typeface="Wingdings" pitchFamily="2" charset="2"/>
+              </a:rPr>
+              <a:t>)</a:t>
             </a:r>
           </a:p>
           <a:p>
@@ -9913,7 +9949,7 @@
           <a:p>
             <a:fld id="{A495A033-A54B-4F41-92C4-F7053274BB0C}" type="datetime1">
               <a:rPr lang="en-US" smtClean="0"/>
-              <a:t>2/23/20</a:t>
+              <a:t>2/24/20</a:t>
             </a:fld>
             <a:endParaRPr lang="en-US" dirty="0"/>
           </a:p>
@@ -9934,13 +9970,13 @@
           <p:nvPr>
             <p:extLst>
               <p:ext uri="{D42A27DB-BD31-4B8C-83A1-F6EECF244321}">
-                <p14:modId xmlns:p14="http://schemas.microsoft.com/office/powerpoint/2010/main" val="1105251706"/>
+                <p14:modId xmlns:p14="http://schemas.microsoft.com/office/powerpoint/2010/main" val="351700342"/>
               </p:ext>
             </p:extLst>
           </p:nvPr>
         </p:nvGraphicFramePr>
         <p:xfrm>
-          <a:off x="146755" y="1145423"/>
+          <a:off x="85029" y="1099124"/>
           <a:ext cx="11898489" cy="5212080"/>
         </p:xfrm>
         <a:graphic>
@@ -11329,7 +11365,7 @@
           <a:p>
             <a:fld id="{863596AC-079A-914A-A4AA-F10BF720D55E}" type="datetime1">
               <a:rPr lang="en-US" smtClean="0"/>
-              <a:t>2/23/20</a:t>
+              <a:t>2/24/20</a:t>
             </a:fld>
             <a:endParaRPr lang="en-US" dirty="0"/>
           </a:p>
@@ -11577,7 +11613,7 @@
           <a:p>
             <a:fld id="{863596AC-079A-914A-A4AA-F10BF720D55E}" type="datetime1">
               <a:rPr lang="en-US" smtClean="0"/>
-              <a:t>2/23/20</a:t>
+              <a:t>2/24/20</a:t>
             </a:fld>
             <a:endParaRPr lang="en-US" dirty="0"/>
           </a:p>
@@ -11825,7 +11861,7 @@
           <a:p>
             <a:fld id="{863596AC-079A-914A-A4AA-F10BF720D55E}" type="datetime1">
               <a:rPr lang="en-US" smtClean="0"/>
-              <a:t>2/23/20</a:t>
+              <a:t>2/24/20</a:t>
             </a:fld>
             <a:endParaRPr lang="en-US" dirty="0"/>
           </a:p>
@@ -12077,7 +12113,7 @@
           <a:p>
             <a:fld id="{863596AC-079A-914A-A4AA-F10BF720D55E}" type="datetime1">
               <a:rPr lang="en-US" smtClean="0"/>
-              <a:t>2/23/20</a:t>
+              <a:t>2/24/20</a:t>
             </a:fld>
             <a:endParaRPr lang="en-US" dirty="0"/>
           </a:p>
@@ -12359,7 +12395,7 @@
           <a:p>
             <a:fld id="{863596AC-079A-914A-A4AA-F10BF720D55E}" type="datetime1">
               <a:rPr lang="en-US" smtClean="0"/>
-              <a:t>2/23/20</a:t>
+              <a:t>2/24/20</a:t>
             </a:fld>
             <a:endParaRPr lang="en-US" dirty="0"/>
           </a:p>
@@ -12641,7 +12677,7 @@
           <a:p>
             <a:fld id="{863596AC-079A-914A-A4AA-F10BF720D55E}" type="datetime1">
               <a:rPr lang="en-US" smtClean="0"/>
-              <a:t>2/23/20</a:t>
+              <a:t>2/24/20</a:t>
             </a:fld>
             <a:endParaRPr lang="en-US" dirty="0"/>
           </a:p>
@@ -12919,7 +12955,7 @@
           <a:p>
             <a:fld id="{863596AC-079A-914A-A4AA-F10BF720D55E}" type="datetime1">
               <a:rPr lang="en-US" smtClean="0"/>
-              <a:t>2/23/20</a:t>
+              <a:t>2/24/20</a:t>
             </a:fld>
             <a:endParaRPr lang="en-US" dirty="0"/>
           </a:p>

</xml_diff>

<commit_message>
a lot of updates
</commit_message>
<xml_diff>
--- a/Documents for Progress/NTUA_TMGReport_24Feb.pptx
+++ b/Documents for Progress/NTUA_TMGReport_24Feb.pptx
@@ -220,7 +220,7 @@
           <a:p>
             <a:fld id="{8CD5EADE-870B-3C4D-92F6-FE927CFCE2A1}" type="datetime1">
               <a:rPr lang="en-US" smtClean="0"/>
-              <a:t>2/24/20</a:t>
+              <a:t>3/4/20</a:t>
             </a:fld>
             <a:endParaRPr lang="en-GB"/>
           </a:p>
@@ -426,7 +426,7 @@
           <a:p>
             <a:fld id="{4A3A8317-869C-EC49-8CB2-3286EE886873}" type="datetime1">
               <a:rPr lang="en-US" smtClean="0"/>
-              <a:t>2/24/20</a:t>
+              <a:t>3/4/20</a:t>
             </a:fld>
             <a:endParaRPr lang="en-GB"/>
           </a:p>
@@ -760,7 +760,7 @@
           <a:p>
             <a:fld id="{B49D5E6A-E658-F947-B519-3BD764463DDB}" type="datetime1">
               <a:rPr lang="en-US" smtClean="0"/>
-              <a:t>2/24/20</a:t>
+              <a:t>3/4/20</a:t>
             </a:fld>
             <a:endParaRPr lang="en-GB"/>
           </a:p>
@@ -1028,7 +1028,7 @@
           <a:p>
             <a:fld id="{3FD6B7D5-59BD-A94A-8259-AFB77C1C6F6C}" type="datetime1">
               <a:rPr lang="en-US" smtClean="0"/>
-              <a:t>2/24/20</a:t>
+              <a:t>3/4/20</a:t>
             </a:fld>
             <a:endParaRPr lang="en-US" dirty="0"/>
           </a:p>
@@ -1235,7 +1235,7 @@
           <a:p>
             <a:fld id="{22747042-83B4-2D44-B16D-692521656AEA}" type="datetime1">
               <a:rPr lang="en-US" smtClean="0"/>
-              <a:t>2/24/20</a:t>
+              <a:t>3/4/20</a:t>
             </a:fld>
             <a:endParaRPr lang="en-US" dirty="0"/>
           </a:p>
@@ -1490,7 +1490,7 @@
           <a:p>
             <a:fld id="{123C6174-D222-ED47-AF35-85B52783FDE1}" type="datetime1">
               <a:rPr lang="en-US" smtClean="0"/>
-              <a:t>2/24/20</a:t>
+              <a:t>3/4/20</a:t>
             </a:fld>
             <a:endParaRPr lang="en-US" dirty="0"/>
           </a:p>
@@ -1681,7 +1681,7 @@
           <a:p>
             <a:fld id="{92BB3830-AA68-4343-953F-F849943EB849}" type="datetime1">
               <a:rPr lang="en-US" smtClean="0"/>
-              <a:t>2/24/20</a:t>
+              <a:t>3/4/20</a:t>
             </a:fld>
             <a:endParaRPr lang="en-GB"/>
           </a:p>
@@ -1855,7 +1855,7 @@
           <a:p>
             <a:fld id="{13F0FE4D-A637-F644-BCB7-BB01E9473082}" type="datetime1">
               <a:rPr lang="en-US" smtClean="0"/>
-              <a:t>2/24/20</a:t>
+              <a:t>3/4/20</a:t>
             </a:fld>
             <a:endParaRPr lang="en-GB"/>
           </a:p>
@@ -2105,7 +2105,7 @@
           <a:p>
             <a:fld id="{7916914C-F633-3B4D-8E7C-AF9878FBCAB2}" type="datetime1">
               <a:rPr lang="en-US" smtClean="0"/>
-              <a:t>2/24/20</a:t>
+              <a:t>3/4/20</a:t>
             </a:fld>
             <a:endParaRPr lang="en-GB"/>
           </a:p>
@@ -2341,7 +2341,7 @@
           <a:p>
             <a:fld id="{1BEE493E-6ECC-2D49-AA37-47715FC69928}" type="datetime1">
               <a:rPr lang="en-US" smtClean="0"/>
-              <a:t>2/24/20</a:t>
+              <a:t>3/4/20</a:t>
             </a:fld>
             <a:endParaRPr lang="en-GB"/>
           </a:p>
@@ -2712,7 +2712,7 @@
           <a:p>
             <a:fld id="{44D2375D-BCDA-CD42-A7D1-F6C0DA2CE615}" type="datetime1">
               <a:rPr lang="en-US" smtClean="0"/>
-              <a:t>2/24/20</a:t>
+              <a:t>3/4/20</a:t>
             </a:fld>
             <a:endParaRPr lang="en-GB"/>
           </a:p>
@@ -2834,7 +2834,7 @@
           <a:p>
             <a:fld id="{DF706FF0-E883-3242-B340-EF59CDD02701}" type="datetime1">
               <a:rPr lang="en-US" smtClean="0"/>
-              <a:t>2/24/20</a:t>
+              <a:t>3/4/20</a:t>
             </a:fld>
             <a:endParaRPr lang="en-GB"/>
           </a:p>
@@ -2933,7 +2933,7 @@
           <a:p>
             <a:fld id="{A72B1547-4678-7444-8B0B-D61236993AA6}" type="datetime1">
               <a:rPr lang="en-US" smtClean="0"/>
-              <a:t>2/24/20</a:t>
+              <a:t>3/4/20</a:t>
             </a:fld>
             <a:endParaRPr lang="en-GB"/>
           </a:p>
@@ -3214,7 +3214,7 @@
           <a:p>
             <a:fld id="{F5C0FF04-D16D-9545-B9FE-2A2509161914}" type="datetime1">
               <a:rPr lang="en-US" smtClean="0"/>
-              <a:t>2/24/20</a:t>
+              <a:t>3/4/20</a:t>
             </a:fld>
             <a:endParaRPr lang="en-GB"/>
           </a:p>
@@ -3370,7 +3370,7 @@
           <a:p>
             <a:fld id="{739BCA09-01A4-7D40-97AF-A677405590ED}" type="datetime1">
               <a:rPr lang="en-US" smtClean="0"/>
-              <a:t>2/24/20</a:t>
+              <a:t>3/4/20</a:t>
             </a:fld>
             <a:endParaRPr lang="en-US" dirty="0"/>
           </a:p>
@@ -3651,7 +3651,7 @@
           <a:p>
             <a:fld id="{95430EDC-66BF-5B4F-9F6B-EF430B2635C2}" type="datetime1">
               <a:rPr lang="en-US" smtClean="0"/>
-              <a:t>2/24/20</a:t>
+              <a:t>3/4/20</a:t>
             </a:fld>
             <a:endParaRPr lang="en-GB"/>
           </a:p>
@@ -3825,7 +3825,7 @@
           <a:p>
             <a:fld id="{C40C6D0C-61E5-A14E-AA64-932059ABBCA0}" type="datetime1">
               <a:rPr lang="en-US" smtClean="0"/>
-              <a:t>2/24/20</a:t>
+              <a:t>3/4/20</a:t>
             </a:fld>
             <a:endParaRPr lang="en-GB"/>
           </a:p>
@@ -4009,7 +4009,7 @@
           <a:p>
             <a:fld id="{686993B2-94FA-8143-ACBD-1339E5A7C63D}" type="datetime1">
               <a:rPr lang="en-US" smtClean="0"/>
-              <a:t>2/24/20</a:t>
+              <a:t>3/4/20</a:t>
             </a:fld>
             <a:endParaRPr lang="en-GB"/>
           </a:p>
@@ -4356,7 +4356,7 @@
           <a:p>
             <a:fld id="{887F3A82-5004-DE46-9B8F-C8D1AE47BCDD}" type="datetime1">
               <a:rPr lang="en-US" smtClean="0"/>
-              <a:t>2/24/20</a:t>
+              <a:t>3/4/20</a:t>
             </a:fld>
             <a:endParaRPr lang="en-US" dirty="0"/>
           </a:p>
@@ -4630,7 +4630,7 @@
           <a:p>
             <a:fld id="{9609816B-101F-E649-A6DB-1B34F62305FD}" type="datetime1">
               <a:rPr lang="en-US" smtClean="0"/>
-              <a:t>2/24/20</a:t>
+              <a:t>3/4/20</a:t>
             </a:fld>
             <a:endParaRPr lang="en-US" dirty="0"/>
           </a:p>
@@ -5008,7 +5008,7 @@
           <a:p>
             <a:fld id="{B4B9C9C3-E10A-4046-99D1-D14A01669CB5}" type="datetime1">
               <a:rPr lang="en-US" smtClean="0"/>
-              <a:t>2/24/20</a:t>
+              <a:t>3/4/20</a:t>
             </a:fld>
             <a:endParaRPr lang="en-US" dirty="0"/>
           </a:p>
@@ -5125,7 +5125,7 @@
           <a:p>
             <a:fld id="{B20DF165-EA06-4348-9825-CC0EB7B994A5}" type="datetime1">
               <a:rPr lang="en-US" smtClean="0"/>
-              <a:t>2/24/20</a:t>
+              <a:t>3/4/20</a:t>
             </a:fld>
             <a:endParaRPr lang="en-US" dirty="0"/>
           </a:p>
@@ -5295,7 +5295,7 @@
           <a:p>
             <a:fld id="{BC939BB5-C2A2-354E-94F1-11C8ABC84871}" type="datetime1">
               <a:rPr lang="en-US" smtClean="0"/>
-              <a:t>2/24/20</a:t>
+              <a:t>3/4/20</a:t>
             </a:fld>
             <a:endParaRPr lang="en-US" dirty="0"/>
           </a:p>
@@ -5679,7 +5679,7 @@
           <a:p>
             <a:fld id="{6BC13A68-213D-F04B-9D09-F80EB8CDDAAA}" type="datetime1">
               <a:rPr lang="en-US" smtClean="0"/>
-              <a:t>2/24/20</a:t>
+              <a:t>3/4/20</a:t>
             </a:fld>
             <a:endParaRPr lang="en-US" dirty="0"/>
           </a:p>
@@ -6061,7 +6061,7 @@
           <a:p>
             <a:fld id="{3C9CB665-2448-6244-98A5-6DB781AF1920}" type="datetime1">
               <a:rPr lang="en-US" smtClean="0"/>
-              <a:t>2/24/20</a:t>
+              <a:t>3/4/20</a:t>
             </a:fld>
             <a:endParaRPr lang="en-US" dirty="0"/>
           </a:p>
@@ -6347,7 +6347,7 @@
           <a:p>
             <a:fld id="{0675E229-76FC-AB46-B5B7-99D6369AD45B}" type="datetime1">
               <a:rPr lang="en-US" smtClean="0"/>
-              <a:t>2/24/20</a:t>
+              <a:t>3/4/20</a:t>
             </a:fld>
             <a:endParaRPr lang="en-US" dirty="0"/>
           </a:p>
@@ -7037,7 +7037,7 @@
           <a:p>
             <a:fld id="{69C84D11-6659-6A4A-919D-F211F249C3CD}" type="datetime1">
               <a:rPr lang="en-US" smtClean="0"/>
-              <a:t>2/24/20</a:t>
+              <a:t>3/4/20</a:t>
             </a:fld>
             <a:endParaRPr lang="en-GB"/>
           </a:p>
@@ -7474,8 +7474,12 @@
               <a:rPr lang="en-US" sz="4400" dirty="0"/>
             </a:br>
             <a:r>
+              <a:rPr lang="en-US" sz="4400" dirty="0" err="1"/>
+              <a:t>ttX</a:t>
+            </a:r>
+            <a:r>
               <a:rPr lang="en-US" sz="4400" dirty="0"/>
-              <a:t>TMG Meeting</a:t>
+              <a:t> Meeting</a:t>
             </a:r>
             <a:br>
               <a:rPr lang="en-US" sz="4400" dirty="0"/>
@@ -7489,7 +7493,7 @@
             </a:br>
             <a:r>
               <a:rPr lang="en-US" sz="4400" dirty="0"/>
-              <a:t>24/2/2020</a:t>
+              <a:t>4/3/2020</a:t>
             </a:r>
             <a:endParaRPr lang="en-GB" sz="4400" dirty="0"/>
           </a:p>
@@ -7599,7 +7603,7 @@
               <a:t>, </a:t>
             </a:r>
             <a:r>
-              <a:rPr lang="en-US" u="sng" dirty="0" err="1"/>
+              <a:rPr lang="en-US" dirty="0" err="1"/>
               <a:t>G.Bakas</a:t>
             </a:r>
             <a:r>
@@ -7607,14 +7611,14 @@
               <a:t>, </a:t>
             </a:r>
             <a:r>
-              <a:rPr lang="en-US" dirty="0"/>
+              <a:rPr lang="en-US" u="sng" dirty="0"/>
               <a:t>I. </a:t>
             </a:r>
             <a:r>
-              <a:rPr lang="en-US" dirty="0" err="1"/>
+              <a:rPr lang="en-US" u="sng" dirty="0" err="1"/>
               <a:t>Papakrivopoulos</a:t>
             </a:r>
-            <a:endParaRPr lang="en-US" dirty="0"/>
+            <a:endParaRPr lang="en-US" u="sng" dirty="0"/>
           </a:p>
         </p:txBody>
       </p:sp>
@@ -7800,7 +7804,7 @@
           <a:p>
             <a:fld id="{863596AC-079A-914A-A4AA-F10BF720D55E}" type="datetime1">
               <a:rPr lang="en-US" smtClean="0"/>
-              <a:t>2/24/20</a:t>
+              <a:t>3/4/20</a:t>
             </a:fld>
             <a:endParaRPr lang="en-US" dirty="0"/>
           </a:p>
@@ -8048,7 +8052,7 @@
           <a:p>
             <a:fld id="{863596AC-079A-914A-A4AA-F10BF720D55E}" type="datetime1">
               <a:rPr lang="en-US" smtClean="0"/>
-              <a:t>2/24/20</a:t>
+              <a:t>3/4/20</a:t>
             </a:fld>
             <a:endParaRPr lang="en-US" dirty="0"/>
           </a:p>
@@ -8296,7 +8300,7 @@
           <a:p>
             <a:fld id="{863596AC-079A-914A-A4AA-F10BF720D55E}" type="datetime1">
               <a:rPr lang="en-US" smtClean="0"/>
-              <a:t>2/24/20</a:t>
+              <a:t>3/4/20</a:t>
             </a:fld>
             <a:endParaRPr lang="en-US" dirty="0"/>
           </a:p>
@@ -8544,7 +8548,7 @@
           <a:p>
             <a:fld id="{863596AC-079A-914A-A4AA-F10BF720D55E}" type="datetime1">
               <a:rPr lang="en-US" smtClean="0"/>
-              <a:t>2/24/20</a:t>
+              <a:t>3/4/20</a:t>
             </a:fld>
             <a:endParaRPr lang="en-US" dirty="0"/>
           </a:p>
@@ -8792,7 +8796,7 @@
           <a:p>
             <a:fld id="{863596AC-079A-914A-A4AA-F10BF720D55E}" type="datetime1">
               <a:rPr lang="en-US" smtClean="0"/>
-              <a:t>2/24/20</a:t>
+              <a:t>3/4/20</a:t>
             </a:fld>
             <a:endParaRPr lang="en-US" dirty="0"/>
           </a:p>
@@ -9064,7 +9068,7 @@
           <a:p>
             <a:fld id="{863596AC-079A-914A-A4AA-F10BF720D55E}" type="datetime1">
               <a:rPr lang="en-US" smtClean="0"/>
-              <a:t>2/24/20</a:t>
+              <a:t>3/4/20</a:t>
             </a:fld>
             <a:endParaRPr lang="en-US" dirty="0"/>
           </a:p>
@@ -9334,7 +9338,7 @@
           <a:p>
             <a:fld id="{863596AC-079A-914A-A4AA-F10BF720D55E}" type="datetime1">
               <a:rPr lang="en-US" smtClean="0"/>
-              <a:t>2/24/20</a:t>
+              <a:t>3/4/20</a:t>
             </a:fld>
             <a:endParaRPr lang="en-US" dirty="0"/>
           </a:p>
@@ -9609,7 +9613,7 @@
           <a:p>
             <a:fld id="{863596AC-079A-914A-A4AA-F10BF720D55E}" type="datetime1">
               <a:rPr lang="en-US" smtClean="0"/>
-              <a:t>2/24/20</a:t>
+              <a:t>3/4/20</a:t>
             </a:fld>
             <a:endParaRPr lang="en-US" dirty="0"/>
           </a:p>
@@ -9949,7 +9953,7 @@
           <a:p>
             <a:fld id="{A495A033-A54B-4F41-92C4-F7053274BB0C}" type="datetime1">
               <a:rPr lang="en-US" smtClean="0"/>
-              <a:t>2/24/20</a:t>
+              <a:t>3/4/20</a:t>
             </a:fld>
             <a:endParaRPr lang="en-US" dirty="0"/>
           </a:p>
@@ -11365,7 +11369,7 @@
           <a:p>
             <a:fld id="{863596AC-079A-914A-A4AA-F10BF720D55E}" type="datetime1">
               <a:rPr lang="en-US" smtClean="0"/>
-              <a:t>2/24/20</a:t>
+              <a:t>3/4/20</a:t>
             </a:fld>
             <a:endParaRPr lang="en-US" dirty="0"/>
           </a:p>
@@ -11613,7 +11617,7 @@
           <a:p>
             <a:fld id="{863596AC-079A-914A-A4AA-F10BF720D55E}" type="datetime1">
               <a:rPr lang="en-US" smtClean="0"/>
-              <a:t>2/24/20</a:t>
+              <a:t>3/4/20</a:t>
             </a:fld>
             <a:endParaRPr lang="en-US" dirty="0"/>
           </a:p>
@@ -11861,7 +11865,7 @@
           <a:p>
             <a:fld id="{863596AC-079A-914A-A4AA-F10BF720D55E}" type="datetime1">
               <a:rPr lang="en-US" smtClean="0"/>
-              <a:t>2/24/20</a:t>
+              <a:t>3/4/20</a:t>
             </a:fld>
             <a:endParaRPr lang="en-US" dirty="0"/>
           </a:p>
@@ -12113,7 +12117,7 @@
           <a:p>
             <a:fld id="{863596AC-079A-914A-A4AA-F10BF720D55E}" type="datetime1">
               <a:rPr lang="en-US" smtClean="0"/>
-              <a:t>2/24/20</a:t>
+              <a:t>3/4/20</a:t>
             </a:fld>
             <a:endParaRPr lang="en-US" dirty="0"/>
           </a:p>
@@ -12395,7 +12399,7 @@
           <a:p>
             <a:fld id="{863596AC-079A-914A-A4AA-F10BF720D55E}" type="datetime1">
               <a:rPr lang="en-US" smtClean="0"/>
-              <a:t>2/24/20</a:t>
+              <a:t>3/4/20</a:t>
             </a:fld>
             <a:endParaRPr lang="en-US" dirty="0"/>
           </a:p>
@@ -12677,7 +12681,7 @@
           <a:p>
             <a:fld id="{863596AC-079A-914A-A4AA-F10BF720D55E}" type="datetime1">
               <a:rPr lang="en-US" smtClean="0"/>
-              <a:t>2/24/20</a:t>
+              <a:t>3/4/20</a:t>
             </a:fld>
             <a:endParaRPr lang="en-US" dirty="0"/>
           </a:p>
@@ -12955,7 +12959,7 @@
           <a:p>
             <a:fld id="{863596AC-079A-914A-A4AA-F10BF720D55E}" type="datetime1">
               <a:rPr lang="en-US" smtClean="0"/>
-              <a:t>2/24/20</a:t>
+              <a:t>3/4/20</a:t>
             </a:fld>
             <a:endParaRPr lang="en-US" dirty="0"/>
           </a:p>

</xml_diff>